<commit_message>
Versão 1.0 de ARQ
</commit_message>
<xml_diff>
--- a/01-SISTEMA/02-ANALISE E PROJETO/ARQ-Documento de Arquitetura.pptx
+++ b/01-SISTEMA/02-ANALISE E PROJETO/ARQ-Documento de Arquitetura.pptx
@@ -7,6 +7,16 @@
   <p:sldIdLst>
     <p:sldId id="256" r:id="rId2"/>
     <p:sldId id="257" r:id="rId3"/>
+    <p:sldId id="258" r:id="rId4"/>
+    <p:sldId id="269" r:id="rId5"/>
+    <p:sldId id="267" r:id="rId6"/>
+    <p:sldId id="264" r:id="rId7"/>
+    <p:sldId id="270" r:id="rId8"/>
+    <p:sldId id="263" r:id="rId9"/>
+    <p:sldId id="259" r:id="rId10"/>
+    <p:sldId id="260" r:id="rId11"/>
+    <p:sldId id="261" r:id="rId12"/>
+    <p:sldId id="262" r:id="rId13"/>
   </p:sldIdLst>
   <p:sldSz cx="9144000" cy="6858000" type="screen4x3"/>
   <p:notesSz cx="6858000" cy="9144000"/>
@@ -289,7 +299,7 @@
           <a:p>
             <a:fld id="{3E1D7F65-8D7D-46D9-8365-93D812578EE0}" type="datetimeFigureOut">
               <a:rPr lang="pt-BR" smtClean="0"/>
-              <a:t>01/12/2015</a:t>
+              <a:t>8/12/2015</a:t>
             </a:fld>
             <a:endParaRPr lang="pt-BR"/>
           </a:p>
@@ -331,7 +341,7 @@
           <a:p>
             <a:fld id="{4FC51D54-6BE4-469E-A743-9DC7C3741ADA}" type="slidenum">
               <a:rPr lang="pt-BR" smtClean="0"/>
-              <a:t>‹#›</a:t>
+              <a:t>‹nº›</a:t>
             </a:fld>
             <a:endParaRPr lang="pt-BR"/>
           </a:p>
@@ -459,7 +469,7 @@
           <a:p>
             <a:fld id="{3E1D7F65-8D7D-46D9-8365-93D812578EE0}" type="datetimeFigureOut">
               <a:rPr lang="pt-BR" smtClean="0"/>
-              <a:t>01/12/2015</a:t>
+              <a:t>8/12/2015</a:t>
             </a:fld>
             <a:endParaRPr lang="pt-BR"/>
           </a:p>
@@ -501,7 +511,7 @@
           <a:p>
             <a:fld id="{4FC51D54-6BE4-469E-A743-9DC7C3741ADA}" type="slidenum">
               <a:rPr lang="pt-BR" smtClean="0"/>
-              <a:t>‹#›</a:t>
+              <a:t>‹nº›</a:t>
             </a:fld>
             <a:endParaRPr lang="pt-BR"/>
           </a:p>
@@ -639,7 +649,7 @@
           <a:p>
             <a:fld id="{3E1D7F65-8D7D-46D9-8365-93D812578EE0}" type="datetimeFigureOut">
               <a:rPr lang="pt-BR" smtClean="0"/>
-              <a:t>01/12/2015</a:t>
+              <a:t>8/12/2015</a:t>
             </a:fld>
             <a:endParaRPr lang="pt-BR"/>
           </a:p>
@@ -681,7 +691,7 @@
           <a:p>
             <a:fld id="{4FC51D54-6BE4-469E-A743-9DC7C3741ADA}" type="slidenum">
               <a:rPr lang="pt-BR" smtClean="0"/>
-              <a:t>‹#›</a:t>
+              <a:t>‹nº›</a:t>
             </a:fld>
             <a:endParaRPr lang="pt-BR"/>
           </a:p>
@@ -809,7 +819,7 @@
           <a:p>
             <a:fld id="{3E1D7F65-8D7D-46D9-8365-93D812578EE0}" type="datetimeFigureOut">
               <a:rPr lang="pt-BR" smtClean="0"/>
-              <a:t>01/12/2015</a:t>
+              <a:t>8/12/2015</a:t>
             </a:fld>
             <a:endParaRPr lang="pt-BR"/>
           </a:p>
@@ -851,7 +861,7 @@
           <a:p>
             <a:fld id="{4FC51D54-6BE4-469E-A743-9DC7C3741ADA}" type="slidenum">
               <a:rPr lang="pt-BR" smtClean="0"/>
-              <a:t>‹#›</a:t>
+              <a:t>‹nº›</a:t>
             </a:fld>
             <a:endParaRPr lang="pt-BR"/>
           </a:p>
@@ -1055,7 +1065,7 @@
           <a:p>
             <a:fld id="{3E1D7F65-8D7D-46D9-8365-93D812578EE0}" type="datetimeFigureOut">
               <a:rPr lang="pt-BR" smtClean="0"/>
-              <a:t>01/12/2015</a:t>
+              <a:t>8/12/2015</a:t>
             </a:fld>
             <a:endParaRPr lang="pt-BR"/>
           </a:p>
@@ -1097,7 +1107,7 @@
           <a:p>
             <a:fld id="{4FC51D54-6BE4-469E-A743-9DC7C3741ADA}" type="slidenum">
               <a:rPr lang="pt-BR" smtClean="0"/>
-              <a:t>‹#›</a:t>
+              <a:t>‹nº›</a:t>
             </a:fld>
             <a:endParaRPr lang="pt-BR"/>
           </a:p>
@@ -1343,7 +1353,7 @@
           <a:p>
             <a:fld id="{3E1D7F65-8D7D-46D9-8365-93D812578EE0}" type="datetimeFigureOut">
               <a:rPr lang="pt-BR" smtClean="0"/>
-              <a:t>01/12/2015</a:t>
+              <a:t>8/12/2015</a:t>
             </a:fld>
             <a:endParaRPr lang="pt-BR"/>
           </a:p>
@@ -1385,7 +1395,7 @@
           <a:p>
             <a:fld id="{4FC51D54-6BE4-469E-A743-9DC7C3741ADA}" type="slidenum">
               <a:rPr lang="pt-BR" smtClean="0"/>
-              <a:t>‹#›</a:t>
+              <a:t>‹nº›</a:t>
             </a:fld>
             <a:endParaRPr lang="pt-BR"/>
           </a:p>
@@ -1765,7 +1775,7 @@
           <a:p>
             <a:fld id="{3E1D7F65-8D7D-46D9-8365-93D812578EE0}" type="datetimeFigureOut">
               <a:rPr lang="pt-BR" smtClean="0"/>
-              <a:t>01/12/2015</a:t>
+              <a:t>8/12/2015</a:t>
             </a:fld>
             <a:endParaRPr lang="pt-BR"/>
           </a:p>
@@ -1807,7 +1817,7 @@
           <a:p>
             <a:fld id="{4FC51D54-6BE4-469E-A743-9DC7C3741ADA}" type="slidenum">
               <a:rPr lang="pt-BR" smtClean="0"/>
-              <a:t>‹#›</a:t>
+              <a:t>‹nº›</a:t>
             </a:fld>
             <a:endParaRPr lang="pt-BR"/>
           </a:p>
@@ -1883,7 +1893,7 @@
           <a:p>
             <a:fld id="{3E1D7F65-8D7D-46D9-8365-93D812578EE0}" type="datetimeFigureOut">
               <a:rPr lang="pt-BR" smtClean="0"/>
-              <a:t>01/12/2015</a:t>
+              <a:t>8/12/2015</a:t>
             </a:fld>
             <a:endParaRPr lang="pt-BR"/>
           </a:p>
@@ -1925,7 +1935,7 @@
           <a:p>
             <a:fld id="{4FC51D54-6BE4-469E-A743-9DC7C3741ADA}" type="slidenum">
               <a:rPr lang="pt-BR" smtClean="0"/>
-              <a:t>‹#›</a:t>
+              <a:t>‹nº›</a:t>
             </a:fld>
             <a:endParaRPr lang="pt-BR"/>
           </a:p>
@@ -1978,7 +1988,7 @@
           <a:p>
             <a:fld id="{3E1D7F65-8D7D-46D9-8365-93D812578EE0}" type="datetimeFigureOut">
               <a:rPr lang="pt-BR" smtClean="0"/>
-              <a:t>01/12/2015</a:t>
+              <a:t>8/12/2015</a:t>
             </a:fld>
             <a:endParaRPr lang="pt-BR"/>
           </a:p>
@@ -2020,7 +2030,7 @@
           <a:p>
             <a:fld id="{4FC51D54-6BE4-469E-A743-9DC7C3741ADA}" type="slidenum">
               <a:rPr lang="pt-BR" smtClean="0"/>
-              <a:t>‹#›</a:t>
+              <a:t>‹nº›</a:t>
             </a:fld>
             <a:endParaRPr lang="pt-BR"/>
           </a:p>
@@ -2255,7 +2265,7 @@
           <a:p>
             <a:fld id="{3E1D7F65-8D7D-46D9-8365-93D812578EE0}" type="datetimeFigureOut">
               <a:rPr lang="pt-BR" smtClean="0"/>
-              <a:t>01/12/2015</a:t>
+              <a:t>8/12/2015</a:t>
             </a:fld>
             <a:endParaRPr lang="pt-BR"/>
           </a:p>
@@ -2297,7 +2307,7 @@
           <a:p>
             <a:fld id="{4FC51D54-6BE4-469E-A743-9DC7C3741ADA}" type="slidenum">
               <a:rPr lang="pt-BR" smtClean="0"/>
-              <a:t>‹#›</a:t>
+              <a:t>‹nº›</a:t>
             </a:fld>
             <a:endParaRPr lang="pt-BR"/>
           </a:p>
@@ -2508,7 +2518,7 @@
           <a:p>
             <a:fld id="{3E1D7F65-8D7D-46D9-8365-93D812578EE0}" type="datetimeFigureOut">
               <a:rPr lang="pt-BR" smtClean="0"/>
-              <a:t>01/12/2015</a:t>
+              <a:t>8/12/2015</a:t>
             </a:fld>
             <a:endParaRPr lang="pt-BR"/>
           </a:p>
@@ -2550,7 +2560,7 @@
           <a:p>
             <a:fld id="{4FC51D54-6BE4-469E-A743-9DC7C3741ADA}" type="slidenum">
               <a:rPr lang="pt-BR" smtClean="0"/>
-              <a:t>‹#›</a:t>
+              <a:t>‹nº›</a:t>
             </a:fld>
             <a:endParaRPr lang="pt-BR"/>
           </a:p>
@@ -2721,7 +2731,7 @@
           <a:p>
             <a:fld id="{3E1D7F65-8D7D-46D9-8365-93D812578EE0}" type="datetimeFigureOut">
               <a:rPr lang="pt-BR" smtClean="0"/>
-              <a:t>01/12/2015</a:t>
+              <a:t>8/12/2015</a:t>
             </a:fld>
             <a:endParaRPr lang="pt-BR"/>
           </a:p>
@@ -2799,7 +2809,7 @@
           <a:p>
             <a:fld id="{4FC51D54-6BE4-469E-A743-9DC7C3741ADA}" type="slidenum">
               <a:rPr lang="pt-BR" smtClean="0"/>
-              <a:t>‹#›</a:t>
+              <a:t>‹nº›</a:t>
             </a:fld>
             <a:endParaRPr lang="pt-BR"/>
           </a:p>
@@ -3115,15 +3125,7 @@
           <a:p>
             <a:r>
               <a:rPr lang="en-US" dirty="0" smtClean="0"/>
-              <a:t>&lt;&lt;Nome do </a:t>
-            </a:r>
-            <a:r>
-              <a:rPr lang="en-US" dirty="0" err="1" smtClean="0"/>
-              <a:t>Projeto</a:t>
-            </a:r>
-            <a:r>
-              <a:rPr lang="en-US" dirty="0" smtClean="0"/>
-              <a:t>&gt;&gt;</a:t>
+              <a:t>SIGEAS</a:t>
             </a:r>
             <a:br>
               <a:rPr lang="en-US" dirty="0" smtClean="0"/>
@@ -3168,8 +3170,8 @@
               <a:t> </a:t>
             </a:r>
             <a:r>
-              <a:rPr lang="en-US" dirty="0" err="1" smtClean="0"/>
-              <a:t>x.x</a:t>
+              <a:rPr lang="en-US" dirty="0" smtClean="0"/>
+              <a:t>1.0</a:t>
             </a:r>
             <a:endParaRPr lang="pt-BR" dirty="0"/>
           </a:p>
@@ -3179,6 +3181,401 @@
     <p:extLst>
       <p:ext uri="{BB962C8B-B14F-4D97-AF65-F5344CB8AC3E}">
         <p14:creationId xmlns:p14="http://schemas.microsoft.com/office/powerpoint/2010/main" val="2556279054"/>
+      </p:ext>
+    </p:extLst>
+  </p:cSld>
+  <p:clrMapOvr>
+    <a:masterClrMapping/>
+  </p:clrMapOvr>
+</p:sld>
+</file>
+
+<file path=ppt/slides/slide10.xml><?xml version="1.0" encoding="utf-8"?>
+<p:sld xmlns:a="http://schemas.openxmlformats.org/drawingml/2006/main" xmlns:r="http://schemas.openxmlformats.org/officeDocument/2006/relationships" xmlns:p="http://schemas.openxmlformats.org/presentationml/2006/main">
+  <p:cSld>
+    <p:spTree>
+      <p:nvGrpSpPr>
+        <p:cNvPr id="1" name=""/>
+        <p:cNvGrpSpPr/>
+        <p:nvPr/>
+      </p:nvGrpSpPr>
+      <p:grpSpPr>
+        <a:xfrm>
+          <a:off x="0" y="0"/>
+          <a:ext cx="0" cy="0"/>
+          <a:chOff x="0" y="0"/>
+          <a:chExt cx="0" cy="0"/>
+        </a:xfrm>
+      </p:grpSpPr>
+      <p:sp>
+        <p:nvSpPr>
+          <p:cNvPr id="2" name="Título 1"/>
+          <p:cNvSpPr>
+            <a:spLocks noGrp="1"/>
+          </p:cNvSpPr>
+          <p:nvPr>
+            <p:ph type="title"/>
+          </p:nvPr>
+        </p:nvSpPr>
+        <p:spPr/>
+        <p:txBody>
+          <a:bodyPr>
+            <a:normAutofit/>
+          </a:bodyPr>
+          <a:lstStyle/>
+          <a:p>
+            <a:r>
+              <a:rPr lang="en-US" dirty="0" err="1"/>
+              <a:t>Visão</a:t>
+            </a:r>
+            <a:r>
+              <a:rPr lang="en-US" dirty="0"/>
+              <a:t> de </a:t>
+            </a:r>
+            <a:r>
+              <a:rPr lang="en-US" dirty="0" err="1" smtClean="0"/>
+              <a:t>Módulos</a:t>
+            </a:r>
+            <a:endParaRPr lang="en-US" dirty="0"/>
+          </a:p>
+        </p:txBody>
+      </p:sp>
+      <p:pic>
+        <p:nvPicPr>
+          <p:cNvPr id="2050" name="Picture 2"/>
+          <p:cNvPicPr>
+            <a:picLocks noGrp="1" noChangeAspect="1" noChangeArrowheads="1"/>
+          </p:cNvPicPr>
+          <p:nvPr>
+            <p:ph idx="1"/>
+          </p:nvPr>
+        </p:nvPicPr>
+        <p:blipFill>
+          <a:blip r:embed="rId2">
+            <a:extLst>
+              <a:ext uri="{28A0092B-C50C-407E-A947-70E740481C1C}">
+                <a14:useLocalDpi xmlns:a14="http://schemas.microsoft.com/office/drawing/2010/main" val="0"/>
+              </a:ext>
+            </a:extLst>
+          </a:blip>
+          <a:srcRect/>
+          <a:stretch>
+            <a:fillRect/>
+          </a:stretch>
+        </p:blipFill>
+        <p:spPr bwMode="auto">
+          <a:xfrm>
+            <a:off x="2658244" y="1600200"/>
+            <a:ext cx="3827511" cy="4525963"/>
+          </a:xfrm>
+          <a:prstGeom prst="rect">
+            <a:avLst/>
+          </a:prstGeom>
+          <a:noFill/>
+          <a:ln>
+            <a:noFill/>
+          </a:ln>
+          <a:effectLst/>
+          <a:extLst>
+            <a:ext uri="{909E8E84-426E-40DD-AFC4-6F175D3DCCD1}">
+              <a14:hiddenFill xmlns:a14="http://schemas.microsoft.com/office/drawing/2010/main">
+                <a:solidFill>
+                  <a:schemeClr val="accent1"/>
+                </a:solidFill>
+              </a14:hiddenFill>
+            </a:ext>
+            <a:ext uri="{91240B29-F687-4F45-9708-019B960494DF}">
+              <a14:hiddenLine xmlns:a14="http://schemas.microsoft.com/office/drawing/2010/main" w="9525">
+                <a:solidFill>
+                  <a:schemeClr val="tx1"/>
+                </a:solidFill>
+                <a:miter lim="800000"/>
+                <a:headEnd/>
+                <a:tailEnd/>
+              </a14:hiddenLine>
+            </a:ext>
+            <a:ext uri="{AF507438-7753-43E0-B8FC-AC1667EBCBE1}">
+              <a14:hiddenEffects xmlns:a14="http://schemas.microsoft.com/office/drawing/2010/main">
+                <a:effectLst>
+                  <a:outerShdw dist="35921" dir="2700000" algn="ctr" rotWithShape="0">
+                    <a:schemeClr val="bg2"/>
+                  </a:outerShdw>
+                </a:effectLst>
+              </a14:hiddenEffects>
+            </a:ext>
+          </a:extLst>
+        </p:spPr>
+      </p:pic>
+    </p:spTree>
+    <p:extLst>
+      <p:ext uri="{BB962C8B-B14F-4D97-AF65-F5344CB8AC3E}">
+        <p14:creationId xmlns:p14="http://schemas.microsoft.com/office/powerpoint/2010/main" val="1702145755"/>
+      </p:ext>
+    </p:extLst>
+  </p:cSld>
+  <p:clrMapOvr>
+    <a:masterClrMapping/>
+  </p:clrMapOvr>
+</p:sld>
+</file>
+
+<file path=ppt/slides/slide11.xml><?xml version="1.0" encoding="utf-8"?>
+<p:sld xmlns:a="http://schemas.openxmlformats.org/drawingml/2006/main" xmlns:r="http://schemas.openxmlformats.org/officeDocument/2006/relationships" xmlns:p="http://schemas.openxmlformats.org/presentationml/2006/main">
+  <p:cSld>
+    <p:spTree>
+      <p:nvGrpSpPr>
+        <p:cNvPr id="1" name=""/>
+        <p:cNvGrpSpPr/>
+        <p:nvPr/>
+      </p:nvGrpSpPr>
+      <p:grpSpPr>
+        <a:xfrm>
+          <a:off x="0" y="0"/>
+          <a:ext cx="0" cy="0"/>
+          <a:chOff x="0" y="0"/>
+          <a:chExt cx="0" cy="0"/>
+        </a:xfrm>
+      </p:grpSpPr>
+      <p:sp>
+        <p:nvSpPr>
+          <p:cNvPr id="2" name="Título 1"/>
+          <p:cNvSpPr>
+            <a:spLocks noGrp="1"/>
+          </p:cNvSpPr>
+          <p:nvPr>
+            <p:ph type="title"/>
+          </p:nvPr>
+        </p:nvSpPr>
+        <p:spPr/>
+        <p:txBody>
+          <a:bodyPr>
+            <a:normAutofit fontScale="90000"/>
+          </a:bodyPr>
+          <a:lstStyle/>
+          <a:p>
+            <a:r>
+              <a:rPr lang="en-US" dirty="0" err="1"/>
+              <a:t>Visão</a:t>
+            </a:r>
+            <a:r>
+              <a:rPr lang="en-US" dirty="0"/>
+              <a:t> de </a:t>
+            </a:r>
+            <a:r>
+              <a:rPr lang="en-US" dirty="0" err="1"/>
+              <a:t>Componentes</a:t>
+            </a:r>
+            <a:r>
+              <a:rPr lang="en-US" dirty="0"/>
+              <a:t> de </a:t>
+            </a:r>
+            <a:r>
+              <a:rPr lang="en-US" dirty="0" err="1" smtClean="0"/>
+              <a:t>Conectores</a:t>
+            </a:r>
+            <a:endParaRPr lang="en-US" dirty="0"/>
+          </a:p>
+        </p:txBody>
+      </p:sp>
+      <p:pic>
+        <p:nvPicPr>
+          <p:cNvPr id="1027" name="Picture 3"/>
+          <p:cNvPicPr>
+            <a:picLocks noGrp="1" noChangeAspect="1" noChangeArrowheads="1"/>
+          </p:cNvPicPr>
+          <p:nvPr>
+            <p:ph idx="1"/>
+          </p:nvPr>
+        </p:nvPicPr>
+        <p:blipFill>
+          <a:blip r:embed="rId2">
+            <a:extLst>
+              <a:ext uri="{28A0092B-C50C-407E-A947-70E740481C1C}">
+                <a14:useLocalDpi xmlns:a14="http://schemas.microsoft.com/office/drawing/2010/main" val="0"/>
+              </a:ext>
+            </a:extLst>
+          </a:blip>
+          <a:srcRect/>
+          <a:stretch>
+            <a:fillRect/>
+          </a:stretch>
+        </p:blipFill>
+        <p:spPr bwMode="auto">
+          <a:xfrm>
+            <a:off x="2057400" y="1600994"/>
+            <a:ext cx="5029200" cy="4524375"/>
+          </a:xfrm>
+          <a:prstGeom prst="rect">
+            <a:avLst/>
+          </a:prstGeom>
+          <a:noFill/>
+          <a:ln>
+            <a:noFill/>
+          </a:ln>
+          <a:effectLst/>
+          <a:extLst>
+            <a:ext uri="{909E8E84-426E-40DD-AFC4-6F175D3DCCD1}">
+              <a14:hiddenFill xmlns:a14="http://schemas.microsoft.com/office/drawing/2010/main">
+                <a:solidFill>
+                  <a:schemeClr val="accent1"/>
+                </a:solidFill>
+              </a14:hiddenFill>
+            </a:ext>
+            <a:ext uri="{91240B29-F687-4F45-9708-019B960494DF}">
+              <a14:hiddenLine xmlns:a14="http://schemas.microsoft.com/office/drawing/2010/main" w="9525">
+                <a:solidFill>
+                  <a:schemeClr val="tx1"/>
+                </a:solidFill>
+                <a:miter lim="800000"/>
+                <a:headEnd/>
+                <a:tailEnd/>
+              </a14:hiddenLine>
+            </a:ext>
+            <a:ext uri="{AF507438-7753-43E0-B8FC-AC1667EBCBE1}">
+              <a14:hiddenEffects xmlns:a14="http://schemas.microsoft.com/office/drawing/2010/main">
+                <a:effectLst>
+                  <a:outerShdw dist="35921" dir="2700000" algn="ctr" rotWithShape="0">
+                    <a:schemeClr val="bg2"/>
+                  </a:outerShdw>
+                </a:effectLst>
+              </a14:hiddenEffects>
+            </a:ext>
+          </a:extLst>
+        </p:spPr>
+      </p:pic>
+    </p:spTree>
+    <p:extLst>
+      <p:ext uri="{BB962C8B-B14F-4D97-AF65-F5344CB8AC3E}">
+        <p14:creationId xmlns:p14="http://schemas.microsoft.com/office/powerpoint/2010/main" val="1989090714"/>
+      </p:ext>
+    </p:extLst>
+  </p:cSld>
+  <p:clrMapOvr>
+    <a:masterClrMapping/>
+  </p:clrMapOvr>
+</p:sld>
+</file>
+
+<file path=ppt/slides/slide12.xml><?xml version="1.0" encoding="utf-8"?>
+<p:sld xmlns:a="http://schemas.openxmlformats.org/drawingml/2006/main" xmlns:r="http://schemas.openxmlformats.org/officeDocument/2006/relationships" xmlns:p="http://schemas.openxmlformats.org/presentationml/2006/main">
+  <p:cSld>
+    <p:spTree>
+      <p:nvGrpSpPr>
+        <p:cNvPr id="1" name=""/>
+        <p:cNvGrpSpPr/>
+        <p:nvPr/>
+      </p:nvGrpSpPr>
+      <p:grpSpPr>
+        <a:xfrm>
+          <a:off x="0" y="0"/>
+          <a:ext cx="0" cy="0"/>
+          <a:chOff x="0" y="0"/>
+          <a:chExt cx="0" cy="0"/>
+        </a:xfrm>
+      </p:grpSpPr>
+      <p:sp>
+        <p:nvSpPr>
+          <p:cNvPr id="2" name="Título 1"/>
+          <p:cNvSpPr>
+            <a:spLocks noGrp="1"/>
+          </p:cNvSpPr>
+          <p:nvPr>
+            <p:ph type="title"/>
+          </p:nvPr>
+        </p:nvSpPr>
+        <p:spPr/>
+        <p:txBody>
+          <a:bodyPr>
+            <a:normAutofit/>
+          </a:bodyPr>
+          <a:lstStyle/>
+          <a:p>
+            <a:r>
+              <a:rPr lang="en-US" dirty="0" err="1"/>
+              <a:t>Visão</a:t>
+            </a:r>
+            <a:r>
+              <a:rPr lang="en-US" dirty="0"/>
+              <a:t> de </a:t>
+            </a:r>
+            <a:r>
+              <a:rPr lang="en-US" dirty="0" err="1" smtClean="0"/>
+              <a:t>Alocação</a:t>
+            </a:r>
+            <a:endParaRPr lang="en-US" dirty="0"/>
+          </a:p>
+        </p:txBody>
+      </p:sp>
+      <p:pic>
+        <p:nvPicPr>
+          <p:cNvPr id="2051" name="Picture 3"/>
+          <p:cNvPicPr>
+            <a:picLocks noGrp="1" noChangeAspect="1" noChangeArrowheads="1"/>
+          </p:cNvPicPr>
+          <p:nvPr>
+            <p:ph idx="1"/>
+          </p:nvPr>
+        </p:nvPicPr>
+        <p:blipFill>
+          <a:blip r:embed="rId2">
+            <a:extLst>
+              <a:ext uri="{28A0092B-C50C-407E-A947-70E740481C1C}">
+                <a14:useLocalDpi xmlns:a14="http://schemas.microsoft.com/office/drawing/2010/main" val="0"/>
+              </a:ext>
+            </a:extLst>
+          </a:blip>
+          <a:srcRect/>
+          <a:stretch>
+            <a:fillRect/>
+          </a:stretch>
+        </p:blipFill>
+        <p:spPr bwMode="auto">
+          <a:xfrm>
+            <a:off x="2566987" y="2696369"/>
+            <a:ext cx="4010025" cy="2333625"/>
+          </a:xfrm>
+          <a:prstGeom prst="rect">
+            <a:avLst/>
+          </a:prstGeom>
+          <a:noFill/>
+          <a:ln>
+            <a:noFill/>
+          </a:ln>
+          <a:effectLst/>
+          <a:extLst>
+            <a:ext uri="{909E8E84-426E-40DD-AFC4-6F175D3DCCD1}">
+              <a14:hiddenFill xmlns:a14="http://schemas.microsoft.com/office/drawing/2010/main">
+                <a:solidFill>
+                  <a:schemeClr val="accent1"/>
+                </a:solidFill>
+              </a14:hiddenFill>
+            </a:ext>
+            <a:ext uri="{91240B29-F687-4F45-9708-019B960494DF}">
+              <a14:hiddenLine xmlns:a14="http://schemas.microsoft.com/office/drawing/2010/main" w="9525">
+                <a:solidFill>
+                  <a:schemeClr val="tx1"/>
+                </a:solidFill>
+                <a:miter lim="800000"/>
+                <a:headEnd/>
+                <a:tailEnd/>
+              </a14:hiddenLine>
+            </a:ext>
+            <a:ext uri="{AF507438-7753-43E0-B8FC-AC1667EBCBE1}">
+              <a14:hiddenEffects xmlns:a14="http://schemas.microsoft.com/office/drawing/2010/main">
+                <a:effectLst>
+                  <a:outerShdw dist="35921" dir="2700000" algn="ctr" rotWithShape="0">
+                    <a:schemeClr val="bg2"/>
+                  </a:outerShdw>
+                </a:effectLst>
+              </a14:hiddenEffects>
+            </a:ext>
+          </a:extLst>
+        </p:spPr>
+      </p:pic>
+    </p:spTree>
+    <p:extLst>
+      <p:ext uri="{BB962C8B-B14F-4D97-AF65-F5344CB8AC3E}">
+        <p14:creationId xmlns:p14="http://schemas.microsoft.com/office/powerpoint/2010/main" val="1266840960"/>
       </p:ext>
     </p:extLst>
   </p:cSld>
@@ -3339,6 +3736,812 @@
     <p:extLst>
       <p:ext uri="{BB962C8B-B14F-4D97-AF65-F5344CB8AC3E}">
         <p14:creationId xmlns:p14="http://schemas.microsoft.com/office/powerpoint/2010/main" val="2332196558"/>
+      </p:ext>
+    </p:extLst>
+  </p:cSld>
+  <p:clrMapOvr>
+    <a:masterClrMapping/>
+  </p:clrMapOvr>
+</p:sld>
+</file>
+
+<file path=ppt/slides/slide3.xml><?xml version="1.0" encoding="utf-8"?>
+<p:sld xmlns:a="http://schemas.openxmlformats.org/drawingml/2006/main" xmlns:r="http://schemas.openxmlformats.org/officeDocument/2006/relationships" xmlns:p="http://schemas.openxmlformats.org/presentationml/2006/main">
+  <p:cSld>
+    <p:spTree>
+      <p:nvGrpSpPr>
+        <p:cNvPr id="1" name=""/>
+        <p:cNvGrpSpPr/>
+        <p:nvPr/>
+      </p:nvGrpSpPr>
+      <p:grpSpPr>
+        <a:xfrm>
+          <a:off x="0" y="0"/>
+          <a:ext cx="0" cy="0"/>
+          <a:chOff x="0" y="0"/>
+          <a:chExt cx="0" cy="0"/>
+        </a:xfrm>
+      </p:grpSpPr>
+      <p:sp>
+        <p:nvSpPr>
+          <p:cNvPr id="2" name="Título 1"/>
+          <p:cNvSpPr>
+            <a:spLocks noGrp="1"/>
+          </p:cNvSpPr>
+          <p:nvPr>
+            <p:ph type="title"/>
+          </p:nvPr>
+        </p:nvSpPr>
+        <p:spPr/>
+        <p:txBody>
+          <a:bodyPr>
+            <a:normAutofit/>
+          </a:bodyPr>
+          <a:lstStyle/>
+          <a:p>
+            <a:r>
+              <a:rPr lang="en-US" dirty="0" err="1"/>
+              <a:t>Atributos</a:t>
+            </a:r>
+            <a:r>
+              <a:rPr lang="en-US" dirty="0"/>
+              <a:t> de </a:t>
+            </a:r>
+            <a:r>
+              <a:rPr lang="en-US" dirty="0" err="1"/>
+              <a:t>qualidade</a:t>
+            </a:r>
+            <a:r>
+              <a:rPr lang="en-US" dirty="0"/>
+              <a:t> do </a:t>
+            </a:r>
+            <a:r>
+              <a:rPr lang="en-US" dirty="0" err="1" smtClean="0"/>
+              <a:t>sistema</a:t>
+            </a:r>
+            <a:endParaRPr lang="en-US" dirty="0"/>
+          </a:p>
+        </p:txBody>
+      </p:sp>
+      <p:sp>
+        <p:nvSpPr>
+          <p:cNvPr id="3" name="Espaço Reservado para Conteúdo 2"/>
+          <p:cNvSpPr>
+            <a:spLocks noGrp="1"/>
+          </p:cNvSpPr>
+          <p:nvPr>
+            <p:ph idx="1"/>
+          </p:nvPr>
+        </p:nvSpPr>
+        <p:spPr/>
+        <p:txBody>
+          <a:bodyPr>
+            <a:normAutofit/>
+          </a:bodyPr>
+          <a:lstStyle/>
+          <a:p>
+            <a:r>
+              <a:rPr lang="pt-BR" dirty="0" smtClean="0"/>
+              <a:t>Usabilidade </a:t>
+            </a:r>
+            <a:endParaRPr lang="pt-BR" dirty="0" smtClean="0"/>
+          </a:p>
+          <a:p>
+            <a:r>
+              <a:rPr lang="pt-BR" dirty="0" err="1" smtClean="0"/>
+              <a:t>Testabilidade</a:t>
+            </a:r>
+            <a:endParaRPr lang="pt-BR" dirty="0" smtClean="0"/>
+          </a:p>
+          <a:p>
+            <a:r>
+              <a:rPr lang="pt-BR" dirty="0" err="1" smtClean="0"/>
+              <a:t>Manutenabilidade</a:t>
+            </a:r>
+            <a:r>
+              <a:rPr lang="pt-BR" dirty="0" smtClean="0"/>
+              <a:t> </a:t>
+            </a:r>
+          </a:p>
+          <a:p>
+            <a:r>
+              <a:rPr lang="pt-BR" dirty="0" smtClean="0"/>
+              <a:t>Segurança </a:t>
+            </a:r>
+          </a:p>
+          <a:p>
+            <a:r>
+              <a:rPr lang="pt-BR" dirty="0" smtClean="0"/>
+              <a:t>Disponibilidade </a:t>
+            </a:r>
+          </a:p>
+          <a:p>
+            <a:r>
+              <a:rPr lang="pt-BR" dirty="0" smtClean="0"/>
+              <a:t>Confiabilidade</a:t>
+            </a:r>
+            <a:endParaRPr lang="en-US" dirty="0"/>
+          </a:p>
+        </p:txBody>
+      </p:sp>
+    </p:spTree>
+    <p:extLst>
+      <p:ext uri="{BB962C8B-B14F-4D97-AF65-F5344CB8AC3E}">
+        <p14:creationId xmlns:p14="http://schemas.microsoft.com/office/powerpoint/2010/main" val="3201262663"/>
+      </p:ext>
+    </p:extLst>
+  </p:cSld>
+  <p:clrMapOvr>
+    <a:masterClrMapping/>
+  </p:clrMapOvr>
+</p:sld>
+</file>
+
+<file path=ppt/slides/slide4.xml><?xml version="1.0" encoding="utf-8"?>
+<p:sld xmlns:a="http://schemas.openxmlformats.org/drawingml/2006/main" xmlns:r="http://schemas.openxmlformats.org/officeDocument/2006/relationships" xmlns:p="http://schemas.openxmlformats.org/presentationml/2006/main">
+  <p:cSld>
+    <p:spTree>
+      <p:nvGrpSpPr>
+        <p:cNvPr id="1" name=""/>
+        <p:cNvGrpSpPr/>
+        <p:nvPr/>
+      </p:nvGrpSpPr>
+      <p:grpSpPr>
+        <a:xfrm>
+          <a:off x="0" y="0"/>
+          <a:ext cx="0" cy="0"/>
+          <a:chOff x="0" y="0"/>
+          <a:chExt cx="0" cy="0"/>
+        </a:xfrm>
+      </p:grpSpPr>
+      <p:sp>
+        <p:nvSpPr>
+          <p:cNvPr id="2" name="Título 1"/>
+          <p:cNvSpPr>
+            <a:spLocks noGrp="1"/>
+          </p:cNvSpPr>
+          <p:nvPr>
+            <p:ph type="title"/>
+          </p:nvPr>
+        </p:nvSpPr>
+        <p:spPr/>
+        <p:txBody>
+          <a:bodyPr>
+            <a:normAutofit/>
+          </a:bodyPr>
+          <a:lstStyle/>
+          <a:p>
+            <a:r>
+              <a:rPr lang="en-US" dirty="0" err="1"/>
+              <a:t>Atributos</a:t>
+            </a:r>
+            <a:r>
+              <a:rPr lang="en-US" dirty="0"/>
+              <a:t> de </a:t>
+            </a:r>
+            <a:r>
+              <a:rPr lang="en-US" dirty="0" err="1"/>
+              <a:t>qualidade</a:t>
+            </a:r>
+            <a:r>
+              <a:rPr lang="en-US" dirty="0"/>
+              <a:t> do </a:t>
+            </a:r>
+            <a:r>
+              <a:rPr lang="en-US" dirty="0" err="1" smtClean="0"/>
+              <a:t>sistema</a:t>
+            </a:r>
+            <a:endParaRPr lang="en-US" dirty="0"/>
+          </a:p>
+        </p:txBody>
+      </p:sp>
+      <p:sp>
+        <p:nvSpPr>
+          <p:cNvPr id="3" name="Espaço Reservado para Conteúdo 2"/>
+          <p:cNvSpPr>
+            <a:spLocks noGrp="1"/>
+          </p:cNvSpPr>
+          <p:nvPr>
+            <p:ph idx="1"/>
+          </p:nvPr>
+        </p:nvSpPr>
+        <p:spPr/>
+        <p:txBody>
+          <a:bodyPr>
+            <a:normAutofit/>
+          </a:bodyPr>
+          <a:lstStyle/>
+          <a:p>
+            <a:r>
+              <a:rPr lang="pt-BR" dirty="0" smtClean="0"/>
+              <a:t>Usabilidade </a:t>
+            </a:r>
+          </a:p>
+          <a:p>
+            <a:pPr lvl="1"/>
+            <a:r>
+              <a:rPr lang="pt-BR" dirty="0" smtClean="0"/>
+              <a:t>Caixa de ajuda em itens do sistema</a:t>
+            </a:r>
+          </a:p>
+          <a:p>
+            <a:pPr lvl="1"/>
+            <a:r>
+              <a:rPr lang="pt-BR" dirty="0"/>
+              <a:t>Ambiente de inscrição nos auxílios de fácil </a:t>
+            </a:r>
+            <a:r>
+              <a:rPr lang="pt-BR" dirty="0" smtClean="0"/>
+              <a:t>uso</a:t>
+            </a:r>
+          </a:p>
+        </p:txBody>
+      </p:sp>
+    </p:spTree>
+    <p:extLst>
+      <p:ext uri="{BB962C8B-B14F-4D97-AF65-F5344CB8AC3E}">
+        <p14:creationId xmlns:p14="http://schemas.microsoft.com/office/powerpoint/2010/main" val="396367248"/>
+      </p:ext>
+    </p:extLst>
+  </p:cSld>
+  <p:clrMapOvr>
+    <a:masterClrMapping/>
+  </p:clrMapOvr>
+</p:sld>
+</file>
+
+<file path=ppt/slides/slide5.xml><?xml version="1.0" encoding="utf-8"?>
+<p:sld xmlns:a="http://schemas.openxmlformats.org/drawingml/2006/main" xmlns:r="http://schemas.openxmlformats.org/officeDocument/2006/relationships" xmlns:p="http://schemas.openxmlformats.org/presentationml/2006/main">
+  <p:cSld>
+    <p:spTree>
+      <p:nvGrpSpPr>
+        <p:cNvPr id="1" name=""/>
+        <p:cNvGrpSpPr/>
+        <p:nvPr/>
+      </p:nvGrpSpPr>
+      <p:grpSpPr>
+        <a:xfrm>
+          <a:off x="0" y="0"/>
+          <a:ext cx="0" cy="0"/>
+          <a:chOff x="0" y="0"/>
+          <a:chExt cx="0" cy="0"/>
+        </a:xfrm>
+      </p:grpSpPr>
+      <p:sp>
+        <p:nvSpPr>
+          <p:cNvPr id="2" name="Título 1"/>
+          <p:cNvSpPr>
+            <a:spLocks noGrp="1"/>
+          </p:cNvSpPr>
+          <p:nvPr>
+            <p:ph type="title"/>
+          </p:nvPr>
+        </p:nvSpPr>
+        <p:spPr/>
+        <p:txBody>
+          <a:bodyPr>
+            <a:normAutofit/>
+          </a:bodyPr>
+          <a:lstStyle/>
+          <a:p>
+            <a:r>
+              <a:rPr lang="en-US" dirty="0" err="1"/>
+              <a:t>Atributos</a:t>
+            </a:r>
+            <a:r>
+              <a:rPr lang="en-US" dirty="0"/>
+              <a:t> de </a:t>
+            </a:r>
+            <a:r>
+              <a:rPr lang="en-US" dirty="0" err="1"/>
+              <a:t>qualidade</a:t>
+            </a:r>
+            <a:r>
+              <a:rPr lang="en-US" dirty="0"/>
+              <a:t> do </a:t>
+            </a:r>
+            <a:r>
+              <a:rPr lang="en-US" dirty="0" err="1" smtClean="0"/>
+              <a:t>sistema</a:t>
+            </a:r>
+            <a:endParaRPr lang="en-US" dirty="0"/>
+          </a:p>
+        </p:txBody>
+      </p:sp>
+      <p:sp>
+        <p:nvSpPr>
+          <p:cNvPr id="3" name="Espaço Reservado para Conteúdo 2"/>
+          <p:cNvSpPr>
+            <a:spLocks noGrp="1"/>
+          </p:cNvSpPr>
+          <p:nvPr>
+            <p:ph idx="1"/>
+          </p:nvPr>
+        </p:nvSpPr>
+        <p:spPr/>
+        <p:txBody>
+          <a:bodyPr>
+            <a:normAutofit/>
+          </a:bodyPr>
+          <a:lstStyle/>
+          <a:p>
+            <a:r>
+              <a:rPr lang="pt-BR" dirty="0" err="1" smtClean="0"/>
+              <a:t>Testabilidade</a:t>
+            </a:r>
+            <a:endParaRPr lang="pt-BR" dirty="0" smtClean="0"/>
+          </a:p>
+          <a:p>
+            <a:pPr lvl="1"/>
+            <a:r>
+              <a:rPr lang="pt-BR" dirty="0"/>
+              <a:t>Testes de Unidade e de Aceitação deverão ser completamente automatizados</a:t>
+            </a:r>
+            <a:endParaRPr lang="pt-BR" dirty="0" smtClean="0"/>
+          </a:p>
+        </p:txBody>
+      </p:sp>
+    </p:spTree>
+    <p:extLst>
+      <p:ext uri="{BB962C8B-B14F-4D97-AF65-F5344CB8AC3E}">
+        <p14:creationId xmlns:p14="http://schemas.microsoft.com/office/powerpoint/2010/main" val="376368505"/>
+      </p:ext>
+    </p:extLst>
+  </p:cSld>
+  <p:clrMapOvr>
+    <a:masterClrMapping/>
+  </p:clrMapOvr>
+</p:sld>
+</file>
+
+<file path=ppt/slides/slide6.xml><?xml version="1.0" encoding="utf-8"?>
+<p:sld xmlns:a="http://schemas.openxmlformats.org/drawingml/2006/main" xmlns:r="http://schemas.openxmlformats.org/officeDocument/2006/relationships" xmlns:p="http://schemas.openxmlformats.org/presentationml/2006/main">
+  <p:cSld>
+    <p:spTree>
+      <p:nvGrpSpPr>
+        <p:cNvPr id="1" name=""/>
+        <p:cNvGrpSpPr/>
+        <p:nvPr/>
+      </p:nvGrpSpPr>
+      <p:grpSpPr>
+        <a:xfrm>
+          <a:off x="0" y="0"/>
+          <a:ext cx="0" cy="0"/>
+          <a:chOff x="0" y="0"/>
+          <a:chExt cx="0" cy="0"/>
+        </a:xfrm>
+      </p:grpSpPr>
+      <p:sp>
+        <p:nvSpPr>
+          <p:cNvPr id="2" name="Título 1"/>
+          <p:cNvSpPr>
+            <a:spLocks noGrp="1"/>
+          </p:cNvSpPr>
+          <p:nvPr>
+            <p:ph type="title"/>
+          </p:nvPr>
+        </p:nvSpPr>
+        <p:spPr/>
+        <p:txBody>
+          <a:bodyPr>
+            <a:normAutofit/>
+          </a:bodyPr>
+          <a:lstStyle/>
+          <a:p>
+            <a:r>
+              <a:rPr lang="en-US" dirty="0" err="1"/>
+              <a:t>Atributos</a:t>
+            </a:r>
+            <a:r>
+              <a:rPr lang="en-US" dirty="0"/>
+              <a:t> de </a:t>
+            </a:r>
+            <a:r>
+              <a:rPr lang="en-US" dirty="0" err="1"/>
+              <a:t>qualidade</a:t>
+            </a:r>
+            <a:r>
+              <a:rPr lang="en-US" dirty="0"/>
+              <a:t> do </a:t>
+            </a:r>
+            <a:r>
+              <a:rPr lang="en-US" dirty="0" err="1" smtClean="0"/>
+              <a:t>sistema</a:t>
+            </a:r>
+            <a:endParaRPr lang="en-US" dirty="0"/>
+          </a:p>
+        </p:txBody>
+      </p:sp>
+      <p:sp>
+        <p:nvSpPr>
+          <p:cNvPr id="3" name="Espaço Reservado para Conteúdo 2"/>
+          <p:cNvSpPr>
+            <a:spLocks noGrp="1"/>
+          </p:cNvSpPr>
+          <p:nvPr>
+            <p:ph idx="1"/>
+          </p:nvPr>
+        </p:nvSpPr>
+        <p:spPr/>
+        <p:txBody>
+          <a:bodyPr>
+            <a:normAutofit/>
+          </a:bodyPr>
+          <a:lstStyle/>
+          <a:p>
+            <a:r>
+              <a:rPr lang="pt-BR" dirty="0" smtClean="0"/>
+              <a:t>Segurança </a:t>
+            </a:r>
+            <a:endParaRPr lang="pt-BR" dirty="0" smtClean="0"/>
+          </a:p>
+          <a:p>
+            <a:pPr lvl="1"/>
+            <a:r>
+              <a:rPr lang="pt-BR" dirty="0" smtClean="0"/>
+              <a:t>Dados como: CPF, RG, Endereço, Filiação e dados socioeconômicos são criptografados no banco de dados.</a:t>
+            </a:r>
+            <a:endParaRPr lang="pt-BR" dirty="0" smtClean="0"/>
+          </a:p>
+        </p:txBody>
+      </p:sp>
+    </p:spTree>
+    <p:extLst>
+      <p:ext uri="{BB962C8B-B14F-4D97-AF65-F5344CB8AC3E}">
+        <p14:creationId xmlns:p14="http://schemas.microsoft.com/office/powerpoint/2010/main" val="1261135631"/>
+      </p:ext>
+    </p:extLst>
+  </p:cSld>
+  <p:clrMapOvr>
+    <a:masterClrMapping/>
+  </p:clrMapOvr>
+</p:sld>
+</file>
+
+<file path=ppt/slides/slide7.xml><?xml version="1.0" encoding="utf-8"?>
+<p:sld xmlns:a="http://schemas.openxmlformats.org/drawingml/2006/main" xmlns:r="http://schemas.openxmlformats.org/officeDocument/2006/relationships" xmlns:p="http://schemas.openxmlformats.org/presentationml/2006/main">
+  <p:cSld>
+    <p:spTree>
+      <p:nvGrpSpPr>
+        <p:cNvPr id="1" name=""/>
+        <p:cNvGrpSpPr/>
+        <p:nvPr/>
+      </p:nvGrpSpPr>
+      <p:grpSpPr>
+        <a:xfrm>
+          <a:off x="0" y="0"/>
+          <a:ext cx="0" cy="0"/>
+          <a:chOff x="0" y="0"/>
+          <a:chExt cx="0" cy="0"/>
+        </a:xfrm>
+      </p:grpSpPr>
+      <p:sp>
+        <p:nvSpPr>
+          <p:cNvPr id="2" name="Título 1"/>
+          <p:cNvSpPr>
+            <a:spLocks noGrp="1"/>
+          </p:cNvSpPr>
+          <p:nvPr>
+            <p:ph type="title"/>
+          </p:nvPr>
+        </p:nvSpPr>
+        <p:spPr/>
+        <p:txBody>
+          <a:bodyPr>
+            <a:normAutofit/>
+          </a:bodyPr>
+          <a:lstStyle/>
+          <a:p>
+            <a:r>
+              <a:rPr lang="en-US" dirty="0" err="1"/>
+              <a:t>Atributos</a:t>
+            </a:r>
+            <a:r>
+              <a:rPr lang="en-US" dirty="0"/>
+              <a:t> de </a:t>
+            </a:r>
+            <a:r>
+              <a:rPr lang="en-US" dirty="0" err="1"/>
+              <a:t>qualidade</a:t>
+            </a:r>
+            <a:r>
+              <a:rPr lang="en-US" dirty="0"/>
+              <a:t> do </a:t>
+            </a:r>
+            <a:r>
+              <a:rPr lang="en-US" dirty="0" err="1" smtClean="0"/>
+              <a:t>sistema</a:t>
+            </a:r>
+            <a:endParaRPr lang="en-US" dirty="0"/>
+          </a:p>
+        </p:txBody>
+      </p:sp>
+      <p:sp>
+        <p:nvSpPr>
+          <p:cNvPr id="3" name="Espaço Reservado para Conteúdo 2"/>
+          <p:cNvSpPr>
+            <a:spLocks noGrp="1"/>
+          </p:cNvSpPr>
+          <p:nvPr>
+            <p:ph idx="1"/>
+          </p:nvPr>
+        </p:nvSpPr>
+        <p:spPr/>
+        <p:txBody>
+          <a:bodyPr>
+            <a:normAutofit/>
+          </a:bodyPr>
+          <a:lstStyle/>
+          <a:p>
+            <a:r>
+              <a:rPr lang="pt-BR" dirty="0" smtClean="0"/>
+              <a:t>Disponibilidade </a:t>
+            </a:r>
+          </a:p>
+          <a:p>
+            <a:pPr lvl="1"/>
+            <a:r>
+              <a:rPr lang="pt-BR" dirty="0"/>
+              <a:t> </a:t>
+            </a:r>
+            <a:r>
+              <a:rPr lang="pt-BR" dirty="0" smtClean="0"/>
+              <a:t>O sistema deve ficar ativo 24/7</a:t>
+            </a:r>
+          </a:p>
+        </p:txBody>
+      </p:sp>
+    </p:spTree>
+    <p:extLst>
+      <p:ext uri="{BB962C8B-B14F-4D97-AF65-F5344CB8AC3E}">
+        <p14:creationId xmlns:p14="http://schemas.microsoft.com/office/powerpoint/2010/main" val="3163320176"/>
+      </p:ext>
+    </p:extLst>
+  </p:cSld>
+  <p:clrMapOvr>
+    <a:masterClrMapping/>
+  </p:clrMapOvr>
+</p:sld>
+</file>
+
+<file path=ppt/slides/slide8.xml><?xml version="1.0" encoding="utf-8"?>
+<p:sld xmlns:a="http://schemas.openxmlformats.org/drawingml/2006/main" xmlns:r="http://schemas.openxmlformats.org/officeDocument/2006/relationships" xmlns:p="http://schemas.openxmlformats.org/presentationml/2006/main">
+  <p:cSld>
+    <p:spTree>
+      <p:nvGrpSpPr>
+        <p:cNvPr id="1" name=""/>
+        <p:cNvGrpSpPr/>
+        <p:nvPr/>
+      </p:nvGrpSpPr>
+      <p:grpSpPr>
+        <a:xfrm>
+          <a:off x="0" y="0"/>
+          <a:ext cx="0" cy="0"/>
+          <a:chOff x="0" y="0"/>
+          <a:chExt cx="0" cy="0"/>
+        </a:xfrm>
+      </p:grpSpPr>
+      <p:sp>
+        <p:nvSpPr>
+          <p:cNvPr id="2" name="Título 1"/>
+          <p:cNvSpPr>
+            <a:spLocks noGrp="1"/>
+          </p:cNvSpPr>
+          <p:nvPr>
+            <p:ph type="title"/>
+          </p:nvPr>
+        </p:nvSpPr>
+        <p:spPr/>
+        <p:txBody>
+          <a:bodyPr>
+            <a:normAutofit/>
+          </a:bodyPr>
+          <a:lstStyle/>
+          <a:p>
+            <a:r>
+              <a:rPr lang="en-US" dirty="0" err="1"/>
+              <a:t>Atributos</a:t>
+            </a:r>
+            <a:r>
+              <a:rPr lang="en-US" dirty="0"/>
+              <a:t> de </a:t>
+            </a:r>
+            <a:r>
+              <a:rPr lang="en-US" dirty="0" err="1"/>
+              <a:t>qualidade</a:t>
+            </a:r>
+            <a:r>
+              <a:rPr lang="en-US" dirty="0"/>
+              <a:t> do </a:t>
+            </a:r>
+            <a:r>
+              <a:rPr lang="en-US" dirty="0" err="1" smtClean="0"/>
+              <a:t>sistema</a:t>
+            </a:r>
+            <a:endParaRPr lang="en-US" dirty="0"/>
+          </a:p>
+        </p:txBody>
+      </p:sp>
+      <p:sp>
+        <p:nvSpPr>
+          <p:cNvPr id="3" name="Espaço Reservado para Conteúdo 2"/>
+          <p:cNvSpPr>
+            <a:spLocks noGrp="1"/>
+          </p:cNvSpPr>
+          <p:nvPr>
+            <p:ph idx="1"/>
+          </p:nvPr>
+        </p:nvSpPr>
+        <p:spPr/>
+        <p:txBody>
+          <a:bodyPr>
+            <a:normAutofit/>
+          </a:bodyPr>
+          <a:lstStyle/>
+          <a:p>
+            <a:r>
+              <a:rPr lang="pt-BR" dirty="0" smtClean="0"/>
+              <a:t>Confiabilidade</a:t>
+            </a:r>
+          </a:p>
+          <a:p>
+            <a:pPr lvl="1"/>
+            <a:r>
+              <a:rPr lang="pt-BR" dirty="0"/>
+              <a:t>Backup de </a:t>
+            </a:r>
+            <a:r>
+              <a:rPr lang="pt-BR" dirty="0" smtClean="0"/>
+              <a:t>dados</a:t>
+            </a:r>
+          </a:p>
+          <a:p>
+            <a:pPr lvl="1"/>
+            <a:r>
+              <a:rPr lang="pt-BR" dirty="0" smtClean="0"/>
+              <a:t>Baixa </a:t>
+            </a:r>
+            <a:r>
+              <a:rPr lang="pt-BR" dirty="0"/>
+              <a:t>taxa de indisponibilidade</a:t>
+            </a:r>
+            <a:endParaRPr lang="en-US" dirty="0"/>
+          </a:p>
+        </p:txBody>
+      </p:sp>
+    </p:spTree>
+    <p:extLst>
+      <p:ext uri="{BB962C8B-B14F-4D97-AF65-F5344CB8AC3E}">
+        <p14:creationId xmlns:p14="http://schemas.microsoft.com/office/powerpoint/2010/main" val="3635091724"/>
+      </p:ext>
+    </p:extLst>
+  </p:cSld>
+  <p:clrMapOvr>
+    <a:masterClrMapping/>
+  </p:clrMapOvr>
+</p:sld>
+</file>
+
+<file path=ppt/slides/slide9.xml><?xml version="1.0" encoding="utf-8"?>
+<p:sld xmlns:a="http://schemas.openxmlformats.org/drawingml/2006/main" xmlns:r="http://schemas.openxmlformats.org/officeDocument/2006/relationships" xmlns:p="http://schemas.openxmlformats.org/presentationml/2006/main">
+  <p:cSld>
+    <p:spTree>
+      <p:nvGrpSpPr>
+        <p:cNvPr id="1" name=""/>
+        <p:cNvGrpSpPr/>
+        <p:nvPr/>
+      </p:nvGrpSpPr>
+      <p:grpSpPr>
+        <a:xfrm>
+          <a:off x="0" y="0"/>
+          <a:ext cx="0" cy="0"/>
+          <a:chOff x="0" y="0"/>
+          <a:chExt cx="0" cy="0"/>
+        </a:xfrm>
+      </p:grpSpPr>
+      <p:sp>
+        <p:nvSpPr>
+          <p:cNvPr id="2" name="Título 1"/>
+          <p:cNvSpPr>
+            <a:spLocks noGrp="1"/>
+          </p:cNvSpPr>
+          <p:nvPr>
+            <p:ph type="title"/>
+          </p:nvPr>
+        </p:nvSpPr>
+        <p:spPr/>
+        <p:txBody>
+          <a:bodyPr>
+            <a:normAutofit/>
+          </a:bodyPr>
+          <a:lstStyle/>
+          <a:p>
+            <a:r>
+              <a:rPr lang="en-US" dirty="0" err="1"/>
+              <a:t>Visão</a:t>
+            </a:r>
+            <a:r>
+              <a:rPr lang="en-US" dirty="0"/>
+              <a:t> de </a:t>
+            </a:r>
+            <a:r>
+              <a:rPr lang="en-US" dirty="0" err="1" smtClean="0"/>
+              <a:t>Subsistemas</a:t>
+            </a:r>
+            <a:endParaRPr lang="en-US" dirty="0"/>
+          </a:p>
+        </p:txBody>
+      </p:sp>
+      <p:pic>
+        <p:nvPicPr>
+          <p:cNvPr id="1026" name="Picture 2"/>
+          <p:cNvPicPr>
+            <a:picLocks noGrp="1" noChangeAspect="1" noChangeArrowheads="1"/>
+          </p:cNvPicPr>
+          <p:nvPr>
+            <p:ph idx="1"/>
+          </p:nvPr>
+        </p:nvPicPr>
+        <p:blipFill>
+          <a:blip r:embed="rId2">
+            <a:extLst>
+              <a:ext uri="{28A0092B-C50C-407E-A947-70E740481C1C}">
+                <a14:useLocalDpi xmlns:a14="http://schemas.microsoft.com/office/drawing/2010/main" val="0"/>
+              </a:ext>
+            </a:extLst>
+          </a:blip>
+          <a:srcRect/>
+          <a:stretch>
+            <a:fillRect/>
+          </a:stretch>
+        </p:blipFill>
+        <p:spPr bwMode="auto">
+          <a:xfrm>
+            <a:off x="1554691" y="1600200"/>
+            <a:ext cx="6034617" cy="4525963"/>
+          </a:xfrm>
+          <a:prstGeom prst="rect">
+            <a:avLst/>
+          </a:prstGeom>
+          <a:noFill/>
+          <a:ln>
+            <a:noFill/>
+          </a:ln>
+          <a:effectLst/>
+          <a:extLst>
+            <a:ext uri="{909E8E84-426E-40DD-AFC4-6F175D3DCCD1}">
+              <a14:hiddenFill xmlns:a14="http://schemas.microsoft.com/office/drawing/2010/main">
+                <a:solidFill>
+                  <a:schemeClr val="accent1"/>
+                </a:solidFill>
+              </a14:hiddenFill>
+            </a:ext>
+            <a:ext uri="{91240B29-F687-4F45-9708-019B960494DF}">
+              <a14:hiddenLine xmlns:a14="http://schemas.microsoft.com/office/drawing/2010/main" w="9525">
+                <a:solidFill>
+                  <a:schemeClr val="tx1"/>
+                </a:solidFill>
+                <a:miter lim="800000"/>
+                <a:headEnd/>
+                <a:tailEnd/>
+              </a14:hiddenLine>
+            </a:ext>
+            <a:ext uri="{AF507438-7753-43E0-B8FC-AC1667EBCBE1}">
+              <a14:hiddenEffects xmlns:a14="http://schemas.microsoft.com/office/drawing/2010/main">
+                <a:effectLst>
+                  <a:outerShdw dist="35921" dir="2700000" algn="ctr" rotWithShape="0">
+                    <a:schemeClr val="bg2"/>
+                  </a:outerShdw>
+                </a:effectLst>
+              </a14:hiddenEffects>
+            </a:ext>
+          </a:extLst>
+        </p:spPr>
+      </p:pic>
+    </p:spTree>
+    <p:extLst>
+      <p:ext uri="{BB962C8B-B14F-4D97-AF65-F5344CB8AC3E}">
+        <p14:creationId xmlns:p14="http://schemas.microsoft.com/office/powerpoint/2010/main" val="839900398"/>
       </p:ext>
     </p:extLst>
   </p:cSld>

</xml_diff>

<commit_message>
VErsão 1.1 de ARQ e Versão 1.1 de DRI
</commit_message>
<xml_diff>
--- a/01-SISTEMA/02-ANALISE E PROJETO/ARQ-Documento de Arquitetura.pptx
+++ b/01-SISTEMA/02-ANALISE E PROJETO/ARQ-Documento de Arquitetura.pptx
@@ -115,6 +115,22 @@
       </a:defRPr>
     </a:lvl9pPr>
   </p:defaultTextStyle>
+  <p:extLst>
+    <p:ext uri="{EFAFB233-063F-42B5-8137-9DF3F51BA10A}">
+      <p15:sldGuideLst xmlns:p15="http://schemas.microsoft.com/office/powerpoint/2012/main">
+        <p15:guide id="1" orient="horz" pos="2160">
+          <p15:clr>
+            <a:srgbClr val="A4A3A4"/>
+          </p15:clr>
+        </p15:guide>
+        <p15:guide id="2" pos="2880">
+          <p15:clr>
+            <a:srgbClr val="A4A3A4"/>
+          </p15:clr>
+        </p15:guide>
+      </p15:sldGuideLst>
+    </p:ext>
+  </p:extLst>
 </p:presentation>
 </file>
 
@@ -299,7 +315,7 @@
           <a:p>
             <a:fld id="{3E1D7F65-8D7D-46D9-8365-93D812578EE0}" type="datetimeFigureOut">
               <a:rPr lang="pt-BR" smtClean="0"/>
-              <a:t>8/12/2015</a:t>
+              <a:t>09/12/2015</a:t>
             </a:fld>
             <a:endParaRPr lang="pt-BR"/>
           </a:p>
@@ -469,7 +485,7 @@
           <a:p>
             <a:fld id="{3E1D7F65-8D7D-46D9-8365-93D812578EE0}" type="datetimeFigureOut">
               <a:rPr lang="pt-BR" smtClean="0"/>
-              <a:t>8/12/2015</a:t>
+              <a:t>09/12/2015</a:t>
             </a:fld>
             <a:endParaRPr lang="pt-BR"/>
           </a:p>
@@ -649,7 +665,7 @@
           <a:p>
             <a:fld id="{3E1D7F65-8D7D-46D9-8365-93D812578EE0}" type="datetimeFigureOut">
               <a:rPr lang="pt-BR" smtClean="0"/>
-              <a:t>8/12/2015</a:t>
+              <a:t>09/12/2015</a:t>
             </a:fld>
             <a:endParaRPr lang="pt-BR"/>
           </a:p>
@@ -819,7 +835,7 @@
           <a:p>
             <a:fld id="{3E1D7F65-8D7D-46D9-8365-93D812578EE0}" type="datetimeFigureOut">
               <a:rPr lang="pt-BR" smtClean="0"/>
-              <a:t>8/12/2015</a:t>
+              <a:t>09/12/2015</a:t>
             </a:fld>
             <a:endParaRPr lang="pt-BR"/>
           </a:p>
@@ -1065,7 +1081,7 @@
           <a:p>
             <a:fld id="{3E1D7F65-8D7D-46D9-8365-93D812578EE0}" type="datetimeFigureOut">
               <a:rPr lang="pt-BR" smtClean="0"/>
-              <a:t>8/12/2015</a:t>
+              <a:t>09/12/2015</a:t>
             </a:fld>
             <a:endParaRPr lang="pt-BR"/>
           </a:p>
@@ -1353,7 +1369,7 @@
           <a:p>
             <a:fld id="{3E1D7F65-8D7D-46D9-8365-93D812578EE0}" type="datetimeFigureOut">
               <a:rPr lang="pt-BR" smtClean="0"/>
-              <a:t>8/12/2015</a:t>
+              <a:t>09/12/2015</a:t>
             </a:fld>
             <a:endParaRPr lang="pt-BR"/>
           </a:p>
@@ -1775,7 +1791,7 @@
           <a:p>
             <a:fld id="{3E1D7F65-8D7D-46D9-8365-93D812578EE0}" type="datetimeFigureOut">
               <a:rPr lang="pt-BR" smtClean="0"/>
-              <a:t>8/12/2015</a:t>
+              <a:t>09/12/2015</a:t>
             </a:fld>
             <a:endParaRPr lang="pt-BR"/>
           </a:p>
@@ -1893,7 +1909,7 @@
           <a:p>
             <a:fld id="{3E1D7F65-8D7D-46D9-8365-93D812578EE0}" type="datetimeFigureOut">
               <a:rPr lang="pt-BR" smtClean="0"/>
-              <a:t>8/12/2015</a:t>
+              <a:t>09/12/2015</a:t>
             </a:fld>
             <a:endParaRPr lang="pt-BR"/>
           </a:p>
@@ -1988,7 +2004,7 @@
           <a:p>
             <a:fld id="{3E1D7F65-8D7D-46D9-8365-93D812578EE0}" type="datetimeFigureOut">
               <a:rPr lang="pt-BR" smtClean="0"/>
-              <a:t>8/12/2015</a:t>
+              <a:t>09/12/2015</a:t>
             </a:fld>
             <a:endParaRPr lang="pt-BR"/>
           </a:p>
@@ -2265,7 +2281,7 @@
           <a:p>
             <a:fld id="{3E1D7F65-8D7D-46D9-8365-93D812578EE0}" type="datetimeFigureOut">
               <a:rPr lang="pt-BR" smtClean="0"/>
-              <a:t>8/12/2015</a:t>
+              <a:t>09/12/2015</a:t>
             </a:fld>
             <a:endParaRPr lang="pt-BR"/>
           </a:p>
@@ -2518,7 +2534,7 @@
           <a:p>
             <a:fld id="{3E1D7F65-8D7D-46D9-8365-93D812578EE0}" type="datetimeFigureOut">
               <a:rPr lang="pt-BR" smtClean="0"/>
-              <a:t>8/12/2015</a:t>
+              <a:t>09/12/2015</a:t>
             </a:fld>
             <a:endParaRPr lang="pt-BR"/>
           </a:p>
@@ -2731,7 +2747,7 @@
           <a:p>
             <a:fld id="{3E1D7F65-8D7D-46D9-8365-93D812578EE0}" type="datetimeFigureOut">
               <a:rPr lang="pt-BR" smtClean="0"/>
-              <a:t>8/12/2015</a:t>
+              <a:t>09/12/2015</a:t>
             </a:fld>
             <a:endParaRPr lang="pt-BR"/>
           </a:p>
@@ -3167,11 +3183,7 @@
             </a:r>
             <a:r>
               <a:rPr lang="en-US" dirty="0" smtClean="0"/>
-              <a:t> </a:t>
-            </a:r>
-            <a:r>
-              <a:rPr lang="en-US" dirty="0" smtClean="0"/>
-              <a:t>1.0</a:t>
+              <a:t> 1.0</a:t>
             </a:r>
             <a:endParaRPr lang="pt-BR" dirty="0"/>
           </a:p>
@@ -3824,7 +3836,6 @@
               <a:rPr lang="pt-BR" dirty="0" smtClean="0"/>
               <a:t>Usabilidade </a:t>
             </a:r>
-            <a:endParaRPr lang="pt-BR" dirty="0" smtClean="0"/>
           </a:p>
           <a:p>
             <a:r>
@@ -4173,7 +4184,6 @@
               <a:rPr lang="pt-BR" dirty="0" smtClean="0"/>
               <a:t>Segurança </a:t>
             </a:r>
-            <a:endParaRPr lang="pt-BR" dirty="0" smtClean="0"/>
           </a:p>
           <a:p>
             <a:pPr lvl="1"/>
@@ -4181,7 +4191,6 @@
               <a:rPr lang="pt-BR" dirty="0" smtClean="0"/>
               <a:t>Dados como: CPF, RG, Endereço, Filiação e dados socioeconômicos são criptografados no banco de dados.</a:t>
             </a:r>
-            <a:endParaRPr lang="pt-BR" dirty="0" smtClean="0"/>
           </a:p>
         </p:txBody>
       </p:sp>
@@ -4394,18 +4403,7 @@
               <a:rPr lang="pt-BR" dirty="0" smtClean="0"/>
               <a:t>dados</a:t>
             </a:r>
-          </a:p>
-          <a:p>
-            <a:pPr lvl="1"/>
-            <a:r>
-              <a:rPr lang="pt-BR" dirty="0" smtClean="0"/>
-              <a:t>Baixa </a:t>
-            </a:r>
-            <a:r>
-              <a:rPr lang="pt-BR" dirty="0"/>
-              <a:t>taxa de indisponibilidade</a:t>
-            </a:r>
-            <a:endParaRPr lang="en-US" dirty="0"/>
+            <a:endParaRPr lang="pt-BR" dirty="0" smtClean="0"/>
           </a:p>
         </p:txBody>
       </p:sp>

</xml_diff>